<commit_message>
Add on content on pp and updateprofile
</commit_message>
<xml_diff>
--- a/presentation/fr81.pptx
+++ b/presentation/fr81.pptx
@@ -289,7 +289,7 @@
           <a:p>
             <a:fld id="{052555F7-EA8D-47E4-8D51-4A3BF7D4E9AA}" type="datetimeFigureOut">
               <a:rPr lang="fr-FR" smtClean="0"/>
-              <a:t>28/03/2018</a:t>
+              <a:t>29/03/2018</a:t>
             </a:fld>
             <a:endParaRPr lang="fr-FR"/>
           </a:p>
@@ -487,7 +487,7 @@
           <a:p>
             <a:fld id="{052555F7-EA8D-47E4-8D51-4A3BF7D4E9AA}" type="datetimeFigureOut">
               <a:rPr lang="fr-FR" smtClean="0"/>
-              <a:t>28/03/2018</a:t>
+              <a:t>29/03/2018</a:t>
             </a:fld>
             <a:endParaRPr lang="fr-FR"/>
           </a:p>
@@ -695,7 +695,7 @@
           <a:p>
             <a:fld id="{052555F7-EA8D-47E4-8D51-4A3BF7D4E9AA}" type="datetimeFigureOut">
               <a:rPr lang="fr-FR" smtClean="0"/>
-              <a:t>28/03/2018</a:t>
+              <a:t>29/03/2018</a:t>
             </a:fld>
             <a:endParaRPr lang="fr-FR"/>
           </a:p>
@@ -989,7 +989,7 @@
           <a:p>
             <a:fld id="{052555F7-EA8D-47E4-8D51-4A3BF7D4E9AA}" type="datetimeFigureOut">
               <a:rPr lang="fr-FR" smtClean="0"/>
-              <a:t>28/03/2018</a:t>
+              <a:t>29/03/2018</a:t>
             </a:fld>
             <a:endParaRPr lang="fr-FR"/>
           </a:p>
@@ -1264,7 +1264,7 @@
           <a:p>
             <a:fld id="{052555F7-EA8D-47E4-8D51-4A3BF7D4E9AA}" type="datetimeFigureOut">
               <a:rPr lang="fr-FR" smtClean="0"/>
-              <a:t>28/03/2018</a:t>
+              <a:t>29/03/2018</a:t>
             </a:fld>
             <a:endParaRPr lang="fr-FR"/>
           </a:p>
@@ -1529,7 +1529,7 @@
           <a:p>
             <a:fld id="{052555F7-EA8D-47E4-8D51-4A3BF7D4E9AA}" type="datetimeFigureOut">
               <a:rPr lang="fr-FR" smtClean="0"/>
-              <a:t>28/03/2018</a:t>
+              <a:t>29/03/2018</a:t>
             </a:fld>
             <a:endParaRPr lang="fr-FR"/>
           </a:p>
@@ -1941,7 +1941,7 @@
           <a:p>
             <a:fld id="{052555F7-EA8D-47E4-8D51-4A3BF7D4E9AA}" type="datetimeFigureOut">
               <a:rPr lang="fr-FR" smtClean="0"/>
-              <a:t>28/03/2018</a:t>
+              <a:t>29/03/2018</a:t>
             </a:fld>
             <a:endParaRPr lang="fr-FR"/>
           </a:p>
@@ -2082,7 +2082,7 @@
           <a:p>
             <a:fld id="{052555F7-EA8D-47E4-8D51-4A3BF7D4E9AA}" type="datetimeFigureOut">
               <a:rPr lang="fr-FR" smtClean="0"/>
-              <a:t>28/03/2018</a:t>
+              <a:t>29/03/2018</a:t>
             </a:fld>
             <a:endParaRPr lang="fr-FR"/>
           </a:p>
@@ -2195,7 +2195,7 @@
           <a:p>
             <a:fld id="{052555F7-EA8D-47E4-8D51-4A3BF7D4E9AA}" type="datetimeFigureOut">
               <a:rPr lang="fr-FR" smtClean="0"/>
-              <a:t>28/03/2018</a:t>
+              <a:t>29/03/2018</a:t>
             </a:fld>
             <a:endParaRPr lang="fr-FR"/>
           </a:p>
@@ -2506,7 +2506,7 @@
           <a:p>
             <a:fld id="{052555F7-EA8D-47E4-8D51-4A3BF7D4E9AA}" type="datetimeFigureOut">
               <a:rPr lang="fr-FR" smtClean="0"/>
-              <a:t>28/03/2018</a:t>
+              <a:t>29/03/2018</a:t>
             </a:fld>
             <a:endParaRPr lang="fr-FR"/>
           </a:p>
@@ -2794,7 +2794,7 @@
           <a:p>
             <a:fld id="{052555F7-EA8D-47E4-8D51-4A3BF7D4E9AA}" type="datetimeFigureOut">
               <a:rPr lang="fr-FR" smtClean="0"/>
-              <a:t>28/03/2018</a:t>
+              <a:t>29/03/2018</a:t>
             </a:fld>
             <a:endParaRPr lang="fr-FR"/>
           </a:p>
@@ -3038,7 +3038,7 @@
           <a:p>
             <a:fld id="{052555F7-EA8D-47E4-8D51-4A3BF7D4E9AA}" type="datetimeFigureOut">
               <a:rPr lang="fr-FR" smtClean="0"/>
-              <a:t>28/03/2018</a:t>
+              <a:t>29/03/2018</a:t>
             </a:fld>
             <a:endParaRPr lang="fr-FR"/>
           </a:p>
@@ -4791,7 +4791,7 @@
           <p:nvPr/>
         </p:nvPicPr>
         <p:blipFill>
-          <a:blip r:embed="rId2">
+          <a:blip r:embed="rId2" cstate="hqprint">
             <a:extLst>
               <a:ext uri="{28A0092B-C50C-407E-A947-70E740481C1C}">
                 <a14:useLocalDpi xmlns:a14="http://schemas.microsoft.com/office/drawing/2010/main" val="0"/>
@@ -4915,7 +4915,7 @@
           <p:nvPr/>
         </p:nvPicPr>
         <p:blipFill>
-          <a:blip r:embed="rId3">
+          <a:blip r:embed="rId3" cstate="hqprint">
             <a:extLst>
               <a:ext uri="{28A0092B-C50C-407E-A947-70E740481C1C}">
                 <a14:useLocalDpi xmlns:a14="http://schemas.microsoft.com/office/drawing/2010/main" val="0"/>
@@ -6048,7 +6048,7 @@
         <p:spPr>
           <a:xfrm>
             <a:off x="2733848" y="4104310"/>
-            <a:ext cx="2912974" cy="456151"/>
+            <a:ext cx="2912974" cy="1384995"/>
           </a:xfrm>
           <a:prstGeom prst="rect">
             <a:avLst/>
@@ -6060,13 +6060,8 @@
           </a:bodyPr>
           <a:lstStyle/>
           <a:p>
-            <a:pPr>
-              <a:lnSpc>
-                <a:spcPct val="200000"/>
-              </a:lnSpc>
-            </a:pPr>
-            <a:r>
-              <a:rPr lang="fr-FR" sz="1400" dirty="0">
+            <a:r>
+              <a:rPr lang="fr-FR" sz="1400" dirty="0" smtClean="0">
                 <a:solidFill>
                   <a:schemeClr val="bg2">
                     <a:lumMod val="50000"/>
@@ -6075,8 +6070,69 @@
                 <a:latin typeface="Segoe UI" panose="020B0502040204020203" pitchFamily="34" charset="0"/>
                 <a:cs typeface="Segoe UI" panose="020B0502040204020203" pitchFamily="34" charset="0"/>
               </a:rPr>
-              <a:t>blablabla</a:t>
-            </a:r>
+              <a:t>-Possibilité de développer une application mobile</a:t>
+            </a:r>
+          </a:p>
+          <a:p>
+            <a:r>
+              <a:rPr lang="fr-FR" sz="1400" dirty="0" smtClean="0">
+                <a:solidFill>
+                  <a:schemeClr val="bg2">
+                    <a:lumMod val="50000"/>
+                  </a:schemeClr>
+                </a:solidFill>
+                <a:latin typeface="Segoe UI" panose="020B0502040204020203" pitchFamily="34" charset="0"/>
+                <a:cs typeface="Segoe UI" panose="020B0502040204020203" pitchFamily="34" charset="0"/>
+              </a:rPr>
+              <a:t>-Vente de l’application à l’internationale</a:t>
+            </a:r>
+          </a:p>
+          <a:p>
+            <a:r>
+              <a:rPr lang="fr-FR" sz="1400" dirty="0" smtClean="0">
+                <a:solidFill>
+                  <a:schemeClr val="bg2">
+                    <a:lumMod val="50000"/>
+                  </a:schemeClr>
+                </a:solidFill>
+                <a:latin typeface="Segoe UI" panose="020B0502040204020203" pitchFamily="34" charset="0"/>
+                <a:cs typeface="Segoe UI" panose="020B0502040204020203" pitchFamily="34" charset="0"/>
+              </a:rPr>
+              <a:t>-Adaptable à d’autres situation de </a:t>
+            </a:r>
+            <a:r>
+              <a:rPr lang="fr-FR" sz="1400" dirty="0" err="1" smtClean="0">
+                <a:solidFill>
+                  <a:schemeClr val="bg2">
+                    <a:lumMod val="50000"/>
+                  </a:schemeClr>
+                </a:solidFill>
+                <a:latin typeface="Segoe UI" panose="020B0502040204020203" pitchFamily="34" charset="0"/>
+                <a:cs typeface="Segoe UI" panose="020B0502040204020203" pitchFamily="34" charset="0"/>
+              </a:rPr>
+              <a:t>matching</a:t>
+            </a:r>
+            <a:r>
+              <a:rPr lang="fr-FR" sz="1400" dirty="0" smtClean="0">
+                <a:solidFill>
+                  <a:schemeClr val="bg2">
+                    <a:lumMod val="50000"/>
+                  </a:schemeClr>
+                </a:solidFill>
+                <a:latin typeface="Segoe UI" panose="020B0502040204020203" pitchFamily="34" charset="0"/>
+                <a:cs typeface="Segoe UI" panose="020B0502040204020203" pitchFamily="34" charset="0"/>
+              </a:rPr>
+              <a:t> (travail, etc…)</a:t>
+            </a:r>
+            <a:endParaRPr lang="fr-FR" sz="1400" dirty="0">
+              <a:solidFill>
+                <a:schemeClr val="bg2">
+                  <a:lumMod val="50000"/>
+                </a:schemeClr>
+              </a:solidFill>
+              <a:latin typeface="Segoe UI" panose="020B0502040204020203" pitchFamily="34" charset="0"/>
+              <a:cs typeface="Segoe UI" panose="020B0502040204020203" pitchFamily="34" charset="0"/>
+            </a:endParaRPr>
           </a:p>
         </p:txBody>
       </p:sp>
@@ -6094,8 +6150,8 @@
         </p:nvSpPr>
         <p:spPr>
           <a:xfrm>
-            <a:off x="7232604" y="1918085"/>
-            <a:ext cx="2912974" cy="456151"/>
+            <a:off x="6944857" y="1584178"/>
+            <a:ext cx="2912974" cy="1169551"/>
           </a:xfrm>
           <a:prstGeom prst="rect">
             <a:avLst/>
@@ -6107,13 +6163,8 @@
           </a:bodyPr>
           <a:lstStyle/>
           <a:p>
-            <a:pPr>
-              <a:lnSpc>
-                <a:spcPct val="200000"/>
-              </a:lnSpc>
-            </a:pPr>
-            <a:r>
-              <a:rPr lang="fr-FR" sz="1400" dirty="0">
+            <a:r>
+              <a:rPr lang="fr-FR" sz="1400" dirty="0" smtClean="0">
                 <a:solidFill>
                   <a:schemeClr val="bg2">
                     <a:lumMod val="50000"/>
@@ -6122,8 +6173,69 @@
                 <a:latin typeface="Segoe UI" panose="020B0502040204020203" pitchFamily="34" charset="0"/>
                 <a:cs typeface="Segoe UI" panose="020B0502040204020203" pitchFamily="34" charset="0"/>
               </a:rPr>
-              <a:t>blablabla</a:t>
-            </a:r>
+              <a:t>-Seulement disponible sur ordinateur</a:t>
+            </a:r>
+          </a:p>
+          <a:p>
+            <a:r>
+              <a:rPr lang="fr-FR" sz="1400" dirty="0" smtClean="0">
+                <a:solidFill>
+                  <a:schemeClr val="bg2">
+                    <a:lumMod val="50000"/>
+                  </a:schemeClr>
+                </a:solidFill>
+                <a:latin typeface="Segoe UI" panose="020B0502040204020203" pitchFamily="34" charset="0"/>
+                <a:cs typeface="Segoe UI" panose="020B0502040204020203" pitchFamily="34" charset="0"/>
+              </a:rPr>
+              <a:t>-Utilisation à court-terme,</a:t>
+            </a:r>
+          </a:p>
+          <a:p>
+            <a:r>
+              <a:rPr lang="fr-FR" sz="1400" dirty="0" smtClean="0">
+                <a:solidFill>
+                  <a:schemeClr val="bg2">
+                    <a:lumMod val="50000"/>
+                  </a:schemeClr>
+                </a:solidFill>
+                <a:latin typeface="Segoe UI" panose="020B0502040204020203" pitchFamily="34" charset="0"/>
+                <a:cs typeface="Segoe UI" panose="020B0502040204020203" pitchFamily="34" charset="0"/>
+              </a:rPr>
+              <a:t>-Besoin de modifier l’application pour chaque client(</a:t>
+            </a:r>
+            <a:r>
+              <a:rPr lang="fr-FR" sz="1400" dirty="0" err="1" smtClean="0">
+                <a:solidFill>
+                  <a:schemeClr val="bg2">
+                    <a:lumMod val="50000"/>
+                  </a:schemeClr>
+                </a:solidFill>
+                <a:latin typeface="Segoe UI" panose="020B0502040204020203" pitchFamily="34" charset="0"/>
+                <a:cs typeface="Segoe UI" panose="020B0502040204020203" pitchFamily="34" charset="0"/>
+              </a:rPr>
+              <a:t>e.g</a:t>
+            </a:r>
+            <a:r>
+              <a:rPr lang="fr-FR" sz="1400" dirty="0" smtClean="0">
+                <a:solidFill>
+                  <a:schemeClr val="bg2">
+                    <a:lumMod val="50000"/>
+                  </a:schemeClr>
+                </a:solidFill>
+                <a:latin typeface="Segoe UI" panose="020B0502040204020203" pitchFamily="34" charset="0"/>
+                <a:cs typeface="Segoe UI" panose="020B0502040204020203" pitchFamily="34" charset="0"/>
+              </a:rPr>
+              <a:t> universités)</a:t>
+            </a:r>
+            <a:endParaRPr lang="fr-FR" sz="1400" dirty="0">
+              <a:solidFill>
+                <a:schemeClr val="bg2">
+                  <a:lumMod val="50000"/>
+                </a:schemeClr>
+              </a:solidFill>
+              <a:latin typeface="Segoe UI" panose="020B0502040204020203" pitchFamily="34" charset="0"/>
+              <a:cs typeface="Segoe UI" panose="020B0502040204020203" pitchFamily="34" charset="0"/>
+            </a:endParaRPr>
           </a:p>
         </p:txBody>
       </p:sp>
@@ -6141,8 +6253,8 @@
         </p:nvSpPr>
         <p:spPr>
           <a:xfrm>
-            <a:off x="3936215" y="2202621"/>
-            <a:ext cx="2912974" cy="456151"/>
+            <a:off x="3851811" y="1004782"/>
+            <a:ext cx="2543231" cy="2031325"/>
           </a:xfrm>
           <a:prstGeom prst="rect">
             <a:avLst/>
@@ -6160,7 +6272,7 @@
               </a:lnSpc>
             </a:pPr>
             <a:r>
-              <a:rPr lang="fr-FR" sz="1400" dirty="0">
+              <a:rPr lang="fr-FR" sz="1400" dirty="0" smtClean="0">
                 <a:solidFill>
                   <a:schemeClr val="bg2">
                     <a:lumMod val="50000"/>
@@ -6169,8 +6281,97 @@
                 <a:latin typeface="Segoe UI" panose="020B0502040204020203" pitchFamily="34" charset="0"/>
                 <a:cs typeface="Segoe UI" panose="020B0502040204020203" pitchFamily="34" charset="0"/>
               </a:rPr>
-              <a:t>blablabla</a:t>
-            </a:r>
+              <a:t>-Nouveau concept</a:t>
+            </a:r>
+          </a:p>
+          <a:p>
+            <a:r>
+              <a:rPr lang="fr-FR" sz="1400" dirty="0" smtClean="0">
+                <a:solidFill>
+                  <a:schemeClr val="bg2">
+                    <a:lumMod val="50000"/>
+                  </a:schemeClr>
+                </a:solidFill>
+                <a:latin typeface="Segoe UI" panose="020B0502040204020203" pitchFamily="34" charset="0"/>
+                <a:cs typeface="Segoe UI" panose="020B0502040204020203" pitchFamily="34" charset="0"/>
+              </a:rPr>
+              <a:t>-Prix de vente faible</a:t>
+            </a:r>
+          </a:p>
+          <a:p>
+            <a:r>
+              <a:rPr lang="fr-FR" sz="1400" dirty="0" smtClean="0">
+                <a:solidFill>
+                  <a:schemeClr val="bg2">
+                    <a:lumMod val="50000"/>
+                  </a:schemeClr>
+                </a:solidFill>
+                <a:latin typeface="Segoe UI" panose="020B0502040204020203" pitchFamily="34" charset="0"/>
+                <a:cs typeface="Segoe UI" panose="020B0502040204020203" pitchFamily="34" charset="0"/>
+              </a:rPr>
+              <a:t>- User </a:t>
+            </a:r>
+            <a:r>
+              <a:rPr lang="fr-FR" sz="1400" dirty="0" err="1" smtClean="0">
+                <a:solidFill>
+                  <a:schemeClr val="bg2">
+                    <a:lumMod val="50000"/>
+                  </a:schemeClr>
+                </a:solidFill>
+                <a:latin typeface="Segoe UI" panose="020B0502040204020203" pitchFamily="34" charset="0"/>
+                <a:cs typeface="Segoe UI" panose="020B0502040204020203" pitchFamily="34" charset="0"/>
+              </a:rPr>
+              <a:t>friendly</a:t>
+            </a:r>
+            <a:r>
+              <a:rPr lang="fr-FR" sz="1400" dirty="0" smtClean="0">
+                <a:solidFill>
+                  <a:schemeClr val="bg2">
+                    <a:lumMod val="50000"/>
+                  </a:schemeClr>
+                </a:solidFill>
+                <a:latin typeface="Segoe UI" panose="020B0502040204020203" pitchFamily="34" charset="0"/>
+                <a:cs typeface="Segoe UI" panose="020B0502040204020203" pitchFamily="34" charset="0"/>
+              </a:rPr>
+              <a:t> </a:t>
+            </a:r>
+          </a:p>
+          <a:p>
+            <a:r>
+              <a:rPr lang="fr-FR" sz="1400" dirty="0" smtClean="0">
+                <a:solidFill>
+                  <a:schemeClr val="bg2">
+                    <a:lumMod val="50000"/>
+                  </a:schemeClr>
+                </a:solidFill>
+                <a:latin typeface="Segoe UI" panose="020B0502040204020203" pitchFamily="34" charset="0"/>
+                <a:cs typeface="Segoe UI" panose="020B0502040204020203" pitchFamily="34" charset="0"/>
+              </a:rPr>
+              <a:t>-Adaptable pour tous les universités française, beaucoup de client potentielles</a:t>
+            </a:r>
+          </a:p>
+          <a:p>
+            <a:r>
+              <a:rPr lang="fr-FR" sz="1400" dirty="0" smtClean="0">
+                <a:solidFill>
+                  <a:schemeClr val="bg2">
+                    <a:lumMod val="50000"/>
+                  </a:schemeClr>
+                </a:solidFill>
+                <a:latin typeface="Segoe UI" panose="020B0502040204020203" pitchFamily="34" charset="0"/>
+                <a:cs typeface="Segoe UI" panose="020B0502040204020203" pitchFamily="34" charset="0"/>
+              </a:rPr>
+              <a:t>-Faible cout de maintenance</a:t>
+            </a:r>
+            <a:endParaRPr lang="fr-FR" sz="1400" dirty="0">
+              <a:solidFill>
+                <a:schemeClr val="bg2">
+                  <a:lumMod val="50000"/>
+                </a:schemeClr>
+              </a:solidFill>
+              <a:latin typeface="Segoe UI" panose="020B0502040204020203" pitchFamily="34" charset="0"/>
+              <a:cs typeface="Segoe UI" panose="020B0502040204020203" pitchFamily="34" charset="0"/>
+            </a:endParaRPr>
           </a:p>
         </p:txBody>
       </p:sp>
@@ -6189,7 +6390,7 @@
         <p:spPr>
           <a:xfrm>
             <a:off x="6836199" y="4127940"/>
-            <a:ext cx="2474852" cy="456151"/>
+            <a:ext cx="2474852" cy="1600438"/>
           </a:xfrm>
           <a:prstGeom prst="rect">
             <a:avLst/>
@@ -6201,13 +6402,8 @@
           </a:bodyPr>
           <a:lstStyle/>
           <a:p>
-            <a:pPr>
-              <a:lnSpc>
-                <a:spcPct val="200000"/>
-              </a:lnSpc>
-            </a:pPr>
-            <a:r>
-              <a:rPr lang="fr-FR" sz="1400" dirty="0">
+            <a:r>
+              <a:rPr lang="fr-FR" sz="1400" dirty="0" smtClean="0">
                 <a:solidFill>
                   <a:schemeClr val="bg2">
                     <a:lumMod val="50000"/>
@@ -6216,8 +6412,45 @@
                 <a:latin typeface="Segoe UI" panose="020B0502040204020203" pitchFamily="34" charset="0"/>
                 <a:cs typeface="Segoe UI" panose="020B0502040204020203" pitchFamily="34" charset="0"/>
               </a:rPr>
-              <a:t>blablabla</a:t>
-            </a:r>
+              <a:t>-Facilement copiable par les autres universités</a:t>
+            </a:r>
+          </a:p>
+          <a:p>
+            <a:r>
+              <a:rPr lang="fr-FR" sz="1400" dirty="0" smtClean="0">
+                <a:solidFill>
+                  <a:schemeClr val="bg2">
+                    <a:lumMod val="50000"/>
+                  </a:schemeClr>
+                </a:solidFill>
+                <a:latin typeface="Segoe UI" panose="020B0502040204020203" pitchFamily="34" charset="0"/>
+                <a:cs typeface="Segoe UI" panose="020B0502040204020203" pitchFamily="34" charset="0"/>
+              </a:rPr>
+              <a:t>-Pas de politiques de protection des données</a:t>
+            </a:r>
+          </a:p>
+          <a:p>
+            <a:r>
+              <a:rPr lang="fr-FR" sz="1400" dirty="0" smtClean="0">
+                <a:solidFill>
+                  <a:schemeClr val="bg2">
+                    <a:lumMod val="50000"/>
+                  </a:schemeClr>
+                </a:solidFill>
+                <a:latin typeface="Segoe UI" panose="020B0502040204020203" pitchFamily="34" charset="0"/>
+                <a:cs typeface="Segoe UI" panose="020B0502040204020203" pitchFamily="34" charset="0"/>
+              </a:rPr>
+              <a:t>-Utilisé ? Fin du lien et rencontre « IRL » pour parrain/marraines</a:t>
+            </a:r>
+            <a:endParaRPr lang="fr-FR" sz="1400" dirty="0">
+              <a:solidFill>
+                <a:schemeClr val="bg2">
+                  <a:lumMod val="50000"/>
+                </a:schemeClr>
+              </a:solidFill>
+              <a:latin typeface="Segoe UI" panose="020B0502040204020203" pitchFamily="34" charset="0"/>
+              <a:cs typeface="Segoe UI" panose="020B0502040204020203" pitchFamily="34" charset="0"/>
+            </a:endParaRPr>
           </a:p>
         </p:txBody>
       </p:sp>
@@ -6405,7 +6638,7 @@
           <p:nvPr/>
         </p:nvPicPr>
         <p:blipFill>
-          <a:blip r:embed="rId2">
+          <a:blip r:embed="rId2" cstate="hqprint">
             <a:extLst>
               <a:ext uri="{28A0092B-C50C-407E-A947-70E740481C1C}">
                 <a14:useLocalDpi xmlns:a14="http://schemas.microsoft.com/office/drawing/2010/main" val="0"/>
@@ -6640,7 +6873,7 @@
           <p:nvPr/>
         </p:nvPicPr>
         <p:blipFill>
-          <a:blip r:embed="rId3">
+          <a:blip r:embed="rId3" cstate="hqprint">
             <a:extLst>
               <a:ext uri="{28A0092B-C50C-407E-A947-70E740481C1C}">
                 <a14:useLocalDpi xmlns:a14="http://schemas.microsoft.com/office/drawing/2010/main" val="0"/>
@@ -6852,7 +7085,7 @@
         </p:nvSpPr>
         <p:spPr>
           <a:xfrm>
-            <a:off x="5570656" y="2341748"/>
+            <a:off x="5646822" y="970483"/>
             <a:ext cx="1892967" cy="1087252"/>
           </a:xfrm>
           <a:prstGeom prst="rect">
@@ -7058,8 +7291,8 @@
         </p:nvSpPr>
         <p:spPr>
           <a:xfrm>
-            <a:off x="2004334" y="3735888"/>
-            <a:ext cx="9025612" cy="889603"/>
+            <a:off x="1372816" y="2857765"/>
+            <a:ext cx="9775304" cy="2235230"/>
           </a:xfrm>
           <a:prstGeom prst="rect">
             <a:avLst/>
@@ -7236,7 +7469,7 @@
               <a:buNone/>
             </a:pPr>
             <a:r>
-              <a:rPr lang="fr-FR" dirty="0">
+              <a:rPr lang="fr-FR" dirty="0" smtClean="0">
                 <a:solidFill>
                   <a:schemeClr val="bg2">
                     <a:lumMod val="50000"/>
@@ -7245,10 +7478,10 @@
                 <a:latin typeface="Segoe UI" panose="020B0502040204020203" pitchFamily="34" charset="0"/>
                 <a:cs typeface="Segoe UI" panose="020B0502040204020203" pitchFamily="34" charset="0"/>
               </a:rPr>
-              <a:t>C’est le taux de réussite des couples parrains-</a:t>
-            </a:r>
-            <a:r>
-              <a:rPr lang="fr-FR" dirty="0" err="1">
+              <a:t>C’est </a:t>
+            </a:r>
+            <a:r>
+              <a:rPr lang="fr-FR" dirty="0">
                 <a:solidFill>
                   <a:schemeClr val="bg2">
                     <a:lumMod val="50000"/>
@@ -7257,10 +7490,10 @@
                 <a:latin typeface="Segoe UI" panose="020B0502040204020203" pitchFamily="34" charset="0"/>
                 <a:cs typeface="Segoe UI" panose="020B0502040204020203" pitchFamily="34" charset="0"/>
               </a:rPr>
-              <a:t>fieul</a:t>
-            </a:r>
-            <a:r>
-              <a:rPr lang="fr-FR" dirty="0">
+              <a:t>le taux de réussite des couples parrains-</a:t>
+            </a:r>
+            <a:r>
+              <a:rPr lang="fr-FR" dirty="0" err="1">
                 <a:solidFill>
                   <a:schemeClr val="bg2">
                     <a:lumMod val="50000"/>
@@ -7269,8 +7502,84 @@
                 <a:latin typeface="Segoe UI" panose="020B0502040204020203" pitchFamily="34" charset="0"/>
                 <a:cs typeface="Segoe UI" panose="020B0502040204020203" pitchFamily="34" charset="0"/>
               </a:rPr>
+              <a:t>fieul</a:t>
+            </a:r>
+            <a:r>
+              <a:rPr lang="fr-FR" dirty="0">
+                <a:solidFill>
+                  <a:schemeClr val="bg2">
+                    <a:lumMod val="50000"/>
+                  </a:schemeClr>
+                </a:solidFill>
+                <a:latin typeface="Segoe UI" panose="020B0502040204020203" pitchFamily="34" charset="0"/>
+                <a:cs typeface="Segoe UI" panose="020B0502040204020203" pitchFamily="34" charset="0"/>
+              </a:rPr>
               <a:t>. </a:t>
             </a:r>
+            <a:endParaRPr lang="fr-FR" dirty="0" smtClean="0">
+              <a:solidFill>
+                <a:schemeClr val="bg2">
+                  <a:lumMod val="50000"/>
+                </a:schemeClr>
+              </a:solidFill>
+              <a:latin typeface="Segoe UI" panose="020B0502040204020203" pitchFamily="34" charset="0"/>
+              <a:cs typeface="Segoe UI" panose="020B0502040204020203" pitchFamily="34" charset="0"/>
+            </a:endParaRPr>
+          </a:p>
+          <a:p>
+            <a:pPr marL="0" indent="0">
+              <a:buNone/>
+            </a:pPr>
+            <a:r>
+              <a:rPr lang="fr-FR" dirty="0" smtClean="0">
+                <a:solidFill>
+                  <a:schemeClr val="bg2">
+                    <a:lumMod val="50000"/>
+                  </a:schemeClr>
+                </a:solidFill>
+                <a:latin typeface="Segoe UI" panose="020B0502040204020203" pitchFamily="34" charset="0"/>
+                <a:cs typeface="Segoe UI" panose="020B0502040204020203" pitchFamily="34" charset="0"/>
+              </a:rPr>
+              <a:t>-Déception face à certains couples parrains/filleules</a:t>
+            </a:r>
+          </a:p>
+          <a:p>
+            <a:pPr marL="0" indent="0">
+              <a:buNone/>
+            </a:pPr>
+            <a:r>
+              <a:rPr lang="fr-FR" dirty="0">
+                <a:solidFill>
+                  <a:schemeClr val="bg2">
+                    <a:lumMod val="50000"/>
+                  </a:schemeClr>
+                </a:solidFill>
+                <a:latin typeface="Segoe UI" panose="020B0502040204020203" pitchFamily="34" charset="0"/>
+                <a:cs typeface="Segoe UI" panose="020B0502040204020203" pitchFamily="34" charset="0"/>
+              </a:rPr>
+              <a:t>	</a:t>
+            </a:r>
+            <a:r>
+              <a:rPr lang="fr-FR" dirty="0" smtClean="0">
+                <a:solidFill>
+                  <a:schemeClr val="bg2">
+                    <a:lumMod val="50000"/>
+                  </a:schemeClr>
+                </a:solidFill>
+                <a:latin typeface="Segoe UI" panose="020B0502040204020203" pitchFamily="34" charset="0"/>
+                <a:cs typeface="Segoe UI" panose="020B0502040204020203" pitchFamily="34" charset="0"/>
+              </a:rPr>
+              <a:t>-&gt; Offre le choix de son binôme = Augmente les chances de réussite et de collaboration</a:t>
+            </a:r>
+            <a:endParaRPr lang="fr-FR" dirty="0">
+              <a:solidFill>
+                <a:schemeClr val="bg2">
+                  <a:lumMod val="50000"/>
+                </a:schemeClr>
+              </a:solidFill>
+              <a:latin typeface="Segoe UI" panose="020B0502040204020203" pitchFamily="34" charset="0"/>
+              <a:cs typeface="Segoe UI" panose="020B0502040204020203" pitchFamily="34" charset="0"/>
+            </a:endParaRPr>
           </a:p>
         </p:txBody>
       </p:sp>
@@ -8381,7 +8690,7 @@
           <p:nvPr/>
         </p:nvPicPr>
         <p:blipFill>
-          <a:blip r:embed="rId4">
+          <a:blip r:embed="rId4" cstate="hqprint">
             <a:extLst>
               <a:ext uri="{28A0092B-C50C-407E-A947-70E740481C1C}">
                 <a14:useLocalDpi xmlns:a14="http://schemas.microsoft.com/office/drawing/2010/main" val="0"/>
@@ -8417,7 +8726,7 @@
           <p:nvPr/>
         </p:nvPicPr>
         <p:blipFill>
-          <a:blip r:embed="rId5">
+          <a:blip r:embed="rId5" cstate="hqprint">
             <a:extLst>
               <a:ext uri="{28A0092B-C50C-407E-A947-70E740481C1C}">
                 <a14:useLocalDpi xmlns:a14="http://schemas.microsoft.com/office/drawing/2010/main" val="0"/>
@@ -8628,7 +8937,7 @@
           <p:nvPr/>
         </p:nvPicPr>
         <p:blipFill>
-          <a:blip r:embed="rId2">
+          <a:blip r:embed="rId2" cstate="hqprint">
             <a:extLst>
               <a:ext uri="{28A0092B-C50C-407E-A947-70E740481C1C}">
                 <a14:useLocalDpi xmlns:a14="http://schemas.microsoft.com/office/drawing/2010/main" val="0"/>
@@ -8664,7 +8973,7 @@
           <p:nvPr/>
         </p:nvPicPr>
         <p:blipFill>
-          <a:blip r:embed="rId3">
+          <a:blip r:embed="rId3" cstate="hqprint">
             <a:extLst>
               <a:ext uri="{28A0092B-C50C-407E-A947-70E740481C1C}">
                 <a14:useLocalDpi xmlns:a14="http://schemas.microsoft.com/office/drawing/2010/main" val="0"/>
@@ -9304,8 +9613,8 @@
         </p:nvSpPr>
         <p:spPr>
           <a:xfrm>
-            <a:off x="2129589" y="2087235"/>
-            <a:ext cx="10515600" cy="4351338"/>
+            <a:off x="389022" y="2087235"/>
+            <a:ext cx="12256167" cy="4351338"/>
           </a:xfrm>
           <a:prstGeom prst="rect">
             <a:avLst/>
@@ -9482,7 +9791,7 @@
               <a:buNone/>
             </a:pPr>
             <a:r>
-              <a:rPr lang="fr-FR" dirty="0">
+              <a:rPr lang="fr-FR" dirty="0" smtClean="0">
                 <a:solidFill>
                   <a:schemeClr val="bg2">
                     <a:lumMod val="50000"/>
@@ -9491,8 +9800,171 @@
                 <a:latin typeface="Segoe UI" panose="020B0502040204020203" pitchFamily="34" charset="0"/>
                 <a:cs typeface="Segoe UI" panose="020B0502040204020203" pitchFamily="34" charset="0"/>
               </a:rPr>
-              <a:t>Texte blablabla</a:t>
-            </a:r>
+              <a:t>● Concept nouveau :</a:t>
+            </a:r>
+          </a:p>
+          <a:p>
+            <a:pPr marL="0" indent="0">
+              <a:buNone/>
+            </a:pPr>
+            <a:r>
+              <a:rPr lang="fr-FR" dirty="0">
+                <a:solidFill>
+                  <a:schemeClr val="bg2">
+                    <a:lumMod val="50000"/>
+                  </a:schemeClr>
+                </a:solidFill>
+                <a:latin typeface="Segoe UI" panose="020B0502040204020203" pitchFamily="34" charset="0"/>
+                <a:cs typeface="Segoe UI" panose="020B0502040204020203" pitchFamily="34" charset="0"/>
+              </a:rPr>
+              <a:t>	</a:t>
+            </a:r>
+            <a:r>
+              <a:rPr lang="fr-FR" dirty="0" smtClean="0">
+                <a:solidFill>
+                  <a:schemeClr val="bg2">
+                    <a:lumMod val="50000"/>
+                  </a:schemeClr>
+                </a:solidFill>
+                <a:latin typeface="Segoe UI" panose="020B0502040204020203" pitchFamily="34" charset="0"/>
+                <a:cs typeface="Segoe UI" panose="020B0502040204020203" pitchFamily="34" charset="0"/>
+              </a:rPr>
+              <a:t>-&gt; Adapter un modèle de rencontre ≠ rencontre amoureuse</a:t>
+            </a:r>
+          </a:p>
+          <a:p>
+            <a:pPr marL="0" indent="0">
+              <a:buNone/>
+            </a:pPr>
+            <a:r>
+              <a:rPr lang="fr-FR" dirty="0">
+                <a:solidFill>
+                  <a:schemeClr val="bg2">
+                    <a:lumMod val="50000"/>
+                  </a:schemeClr>
+                </a:solidFill>
+                <a:latin typeface="Segoe UI" panose="020B0502040204020203" pitchFamily="34" charset="0"/>
+                <a:cs typeface="Segoe UI" panose="020B0502040204020203" pitchFamily="34" charset="0"/>
+              </a:rPr>
+              <a:t>	</a:t>
+            </a:r>
+            <a:r>
+              <a:rPr lang="fr-FR" dirty="0">
+                <a:solidFill>
+                  <a:schemeClr val="bg2">
+                    <a:lumMod val="50000"/>
+                  </a:schemeClr>
+                </a:solidFill>
+                <a:latin typeface="Segoe UI" panose="020B0502040204020203" pitchFamily="34" charset="0"/>
+                <a:cs typeface="Segoe UI" panose="020B0502040204020203" pitchFamily="34" charset="0"/>
+              </a:rPr>
+              <a:t>	</a:t>
+            </a:r>
+            <a:r>
+              <a:rPr lang="fr-FR" dirty="0" smtClean="0">
+                <a:solidFill>
+                  <a:schemeClr val="bg2">
+                    <a:lumMod val="50000"/>
+                  </a:schemeClr>
+                </a:solidFill>
+                <a:latin typeface="Segoe UI" panose="020B0502040204020203" pitchFamily="34" charset="0"/>
+                <a:cs typeface="Segoe UI" panose="020B0502040204020203" pitchFamily="34" charset="0"/>
+              </a:rPr>
+              <a:t>= Pas d’autres applis comme celle-ci</a:t>
+            </a:r>
+          </a:p>
+          <a:p>
+            <a:pPr marL="0" indent="0">
+              <a:buNone/>
+            </a:pPr>
+            <a:r>
+              <a:rPr lang="fr-FR" dirty="0" smtClean="0">
+                <a:solidFill>
+                  <a:schemeClr val="bg2">
+                    <a:lumMod val="50000"/>
+                  </a:schemeClr>
+                </a:solidFill>
+                <a:latin typeface="Segoe UI" panose="020B0502040204020203" pitchFamily="34" charset="0"/>
+                <a:cs typeface="Segoe UI" panose="020B0502040204020203" pitchFamily="34" charset="0"/>
+              </a:rPr>
+              <a:t>● Très proche du modèle de </a:t>
+            </a:r>
+            <a:r>
+              <a:rPr lang="fr-FR" dirty="0" err="1" smtClean="0">
+                <a:solidFill>
+                  <a:schemeClr val="bg2">
+                    <a:lumMod val="50000"/>
+                  </a:schemeClr>
+                </a:solidFill>
+                <a:latin typeface="Segoe UI" panose="020B0502040204020203" pitchFamily="34" charset="0"/>
+                <a:cs typeface="Segoe UI" panose="020B0502040204020203" pitchFamily="34" charset="0"/>
+              </a:rPr>
+              <a:t>Tinder</a:t>
+            </a:r>
+            <a:r>
+              <a:rPr lang="fr-FR" dirty="0" smtClean="0">
+                <a:solidFill>
+                  <a:schemeClr val="bg2">
+                    <a:lumMod val="50000"/>
+                  </a:schemeClr>
+                </a:solidFill>
+                <a:latin typeface="Segoe UI" panose="020B0502040204020203" pitchFamily="34" charset="0"/>
+                <a:cs typeface="Segoe UI" panose="020B0502040204020203" pitchFamily="34" charset="0"/>
+              </a:rPr>
+              <a:t>(syntaxe/design/fonctionnement)</a:t>
+            </a:r>
+          </a:p>
+          <a:p>
+            <a:pPr marL="0" indent="0">
+              <a:buNone/>
+            </a:pPr>
+            <a:r>
+              <a:rPr lang="fr-FR" dirty="0">
+                <a:solidFill>
+                  <a:schemeClr val="bg2">
+                    <a:lumMod val="50000"/>
+                  </a:schemeClr>
+                </a:solidFill>
+                <a:latin typeface="Segoe UI" panose="020B0502040204020203" pitchFamily="34" charset="0"/>
+                <a:cs typeface="Segoe UI" panose="020B0502040204020203" pitchFamily="34" charset="0"/>
+              </a:rPr>
+              <a:t>	</a:t>
+            </a:r>
+            <a:endParaRPr lang="fr-FR" dirty="0" smtClean="0">
+              <a:solidFill>
+                <a:schemeClr val="bg2">
+                  <a:lumMod val="50000"/>
+                </a:schemeClr>
+              </a:solidFill>
+              <a:latin typeface="Segoe UI" panose="020B0502040204020203" pitchFamily="34" charset="0"/>
+              <a:cs typeface="Segoe UI" panose="020B0502040204020203" pitchFamily="34" charset="0"/>
+            </a:endParaRPr>
+          </a:p>
+          <a:p>
+            <a:pPr marL="0" indent="0">
+              <a:buNone/>
+            </a:pPr>
+            <a:r>
+              <a:rPr lang="fr-FR" dirty="0" smtClean="0">
+                <a:solidFill>
+                  <a:schemeClr val="bg2">
+                    <a:lumMod val="50000"/>
+                  </a:schemeClr>
+                </a:solidFill>
+                <a:latin typeface="Segoe UI" panose="020B0502040204020203" pitchFamily="34" charset="0"/>
+                <a:cs typeface="Segoe UI" panose="020B0502040204020203" pitchFamily="34" charset="0"/>
+              </a:rPr>
+              <a:t>● Autres universités =&gt; développement possible par leurs étudiants</a:t>
+            </a:r>
+            <a:endParaRPr lang="fr-FR" dirty="0">
+              <a:solidFill>
+                <a:schemeClr val="bg2">
+                  <a:lumMod val="50000"/>
+                </a:schemeClr>
+              </a:solidFill>
+              <a:latin typeface="Segoe UI" panose="020B0502040204020203" pitchFamily="34" charset="0"/>
+              <a:cs typeface="Segoe UI" panose="020B0502040204020203" pitchFamily="34" charset="0"/>
+            </a:endParaRPr>
           </a:p>
         </p:txBody>
       </p:sp>
@@ -11048,7 +11520,7 @@
           <p:nvPr/>
         </p:nvPicPr>
         <p:blipFill>
-          <a:blip r:embed="rId2">
+          <a:blip r:embed="rId2" cstate="hqprint">
             <a:extLst>
               <a:ext uri="{28A0092B-C50C-407E-A947-70E740481C1C}">
                 <a14:useLocalDpi xmlns:a14="http://schemas.microsoft.com/office/drawing/2010/main" val="0"/>
@@ -11301,7 +11773,7 @@
           <p:nvPr/>
         </p:nvPicPr>
         <p:blipFill>
-          <a:blip r:embed="rId3">
+          <a:blip r:embed="rId3" cstate="hqprint">
             <a:extLst>
               <a:ext uri="{28A0092B-C50C-407E-A947-70E740481C1C}">
                 <a14:useLocalDpi xmlns:a14="http://schemas.microsoft.com/office/drawing/2010/main" val="0"/>
@@ -14472,7 +14944,7 @@
           <p:nvPr/>
         </p:nvPicPr>
         <p:blipFill>
-          <a:blip r:embed="rId2">
+          <a:blip r:embed="rId2" cstate="hqprint">
             <a:extLst>
               <a:ext uri="{28A0092B-C50C-407E-A947-70E740481C1C}">
                 <a14:useLocalDpi xmlns:a14="http://schemas.microsoft.com/office/drawing/2010/main" val="0"/>
@@ -14767,7 +15239,7 @@
           <p:nvPr/>
         </p:nvPicPr>
         <p:blipFill>
-          <a:blip r:embed="rId3">
+          <a:blip r:embed="rId3" cstate="hqprint">
             <a:extLst>
               <a:ext uri="{28A0092B-C50C-407E-A947-70E740481C1C}">
                 <a14:useLocalDpi xmlns:a14="http://schemas.microsoft.com/office/drawing/2010/main" val="0"/>
@@ -14929,7 +15401,7 @@
           <p:nvPr/>
         </p:nvPicPr>
         <p:blipFill>
-          <a:blip r:embed="rId3">
+          <a:blip r:embed="rId3" cstate="hqprint">
             <a:extLst>
               <a:ext uri="{28A0092B-C50C-407E-A947-70E740481C1C}">
                 <a14:useLocalDpi xmlns:a14="http://schemas.microsoft.com/office/drawing/2010/main" val="0"/>
@@ -15085,7 +15557,7 @@
           <p:nvPr/>
         </p:nvPicPr>
         <p:blipFill>
-          <a:blip r:embed="rId6">
+          <a:blip r:embed="rId6" cstate="hqprint">
             <a:extLst>
               <a:ext uri="{28A0092B-C50C-407E-A947-70E740481C1C}">
                 <a14:useLocalDpi xmlns:a14="http://schemas.microsoft.com/office/drawing/2010/main" val="0"/>
@@ -15121,7 +15593,7 @@
           <p:nvPr/>
         </p:nvPicPr>
         <p:blipFill>
-          <a:blip r:embed="rId7">
+          <a:blip r:embed="rId7" cstate="hqprint">
             <a:extLst>
               <a:ext uri="{28A0092B-C50C-407E-A947-70E740481C1C}">
                 <a14:useLocalDpi xmlns:a14="http://schemas.microsoft.com/office/drawing/2010/main" val="0"/>
@@ -15564,7 +16036,7 @@
           <p:nvPr/>
         </p:nvPicPr>
         <p:blipFill>
-          <a:blip r:embed="rId2">
+          <a:blip r:embed="rId2" cstate="hqprint">
             <a:extLst>
               <a:ext uri="{28A0092B-C50C-407E-A947-70E740481C1C}">
                 <a14:useLocalDpi xmlns:a14="http://schemas.microsoft.com/office/drawing/2010/main" val="0"/>
@@ -15730,7 +16202,7 @@
           <p:nvPr/>
         </p:nvPicPr>
         <p:blipFill>
-          <a:blip r:embed="rId3">
+          <a:blip r:embed="rId3" cstate="hqprint">
             <a:extLst>
               <a:ext uri="{28A0092B-C50C-407E-A947-70E740481C1C}">
                 <a14:useLocalDpi xmlns:a14="http://schemas.microsoft.com/office/drawing/2010/main" val="0"/>
@@ -15854,8 +16326,8 @@
         </p:nvSpPr>
         <p:spPr>
           <a:xfrm>
-            <a:off x="2129589" y="2087235"/>
-            <a:ext cx="10515600" cy="4351338"/>
+            <a:off x="389022" y="1658679"/>
+            <a:ext cx="12256167" cy="4779894"/>
           </a:xfrm>
           <a:prstGeom prst="rect">
             <a:avLst/>
@@ -16032,7 +16504,7 @@
               <a:buNone/>
             </a:pPr>
             <a:r>
-              <a:rPr lang="fr-FR" dirty="0">
+              <a:rPr lang="fr-FR" dirty="0" smtClean="0">
                 <a:solidFill>
                   <a:schemeClr val="bg2">
                     <a:lumMod val="50000"/>
@@ -16041,8 +16513,130 @@
                 <a:latin typeface="Segoe UI" panose="020B0502040204020203" pitchFamily="34" charset="0"/>
                 <a:cs typeface="Segoe UI" panose="020B0502040204020203" pitchFamily="34" charset="0"/>
               </a:rPr>
-              <a:t>Texte blablabla</a:t>
-            </a:r>
+              <a:t>● Expérience personnelle = Relation mauvaise avec nos parrains/filleules actuelles</a:t>
+            </a:r>
+          </a:p>
+          <a:p>
+            <a:pPr marL="0" indent="0">
+              <a:buNone/>
+            </a:pPr>
+            <a:endParaRPr lang="fr-FR" dirty="0">
+              <a:solidFill>
+                <a:schemeClr val="bg2">
+                  <a:lumMod val="50000"/>
+                </a:schemeClr>
+              </a:solidFill>
+              <a:latin typeface="Segoe UI" panose="020B0502040204020203" pitchFamily="34" charset="0"/>
+              <a:cs typeface="Segoe UI" panose="020B0502040204020203" pitchFamily="34" charset="0"/>
+            </a:endParaRPr>
+          </a:p>
+          <a:p>
+            <a:pPr marL="0" indent="0">
+              <a:buNone/>
+            </a:pPr>
+            <a:r>
+              <a:rPr lang="fr-FR" dirty="0" smtClean="0">
+                <a:solidFill>
+                  <a:schemeClr val="bg2">
+                    <a:lumMod val="50000"/>
+                  </a:schemeClr>
+                </a:solidFill>
+                <a:latin typeface="Segoe UI" panose="020B0502040204020203" pitchFamily="34" charset="0"/>
+                <a:cs typeface="Segoe UI" panose="020B0502040204020203" pitchFamily="34" charset="0"/>
+              </a:rPr>
+              <a:t>● Réinventer cette phase de «</a:t>
+            </a:r>
+            <a:r>
+              <a:rPr lang="fr-FR" dirty="0" err="1" smtClean="0">
+                <a:solidFill>
+                  <a:schemeClr val="bg2">
+                    <a:lumMod val="50000"/>
+                  </a:schemeClr>
+                </a:solidFill>
+                <a:latin typeface="Segoe UI" panose="020B0502040204020203" pitchFamily="34" charset="0"/>
+                <a:cs typeface="Segoe UI" panose="020B0502040204020203" pitchFamily="34" charset="0"/>
+              </a:rPr>
+              <a:t>matching</a:t>
+            </a:r>
+            <a:r>
+              <a:rPr lang="fr-FR" dirty="0" smtClean="0">
+                <a:solidFill>
+                  <a:schemeClr val="bg2">
+                    <a:lumMod val="50000"/>
+                  </a:schemeClr>
+                </a:solidFill>
+                <a:latin typeface="Segoe UI" panose="020B0502040204020203" pitchFamily="34" charset="0"/>
+                <a:cs typeface="Segoe UI" panose="020B0502040204020203" pitchFamily="34" charset="0"/>
+              </a:rPr>
+              <a:t>»</a:t>
+            </a:r>
+          </a:p>
+          <a:p>
+            <a:pPr marL="0" indent="0">
+              <a:buNone/>
+            </a:pPr>
+            <a:r>
+              <a:rPr lang="fr-FR" dirty="0">
+                <a:solidFill>
+                  <a:schemeClr val="bg2">
+                    <a:lumMod val="50000"/>
+                  </a:schemeClr>
+                </a:solidFill>
+                <a:latin typeface="Segoe UI" panose="020B0502040204020203" pitchFamily="34" charset="0"/>
+                <a:cs typeface="Segoe UI" panose="020B0502040204020203" pitchFamily="34" charset="0"/>
+              </a:rPr>
+              <a:t>	</a:t>
+            </a:r>
+            <a:r>
+              <a:rPr lang="fr-FR" dirty="0" smtClean="0">
+                <a:solidFill>
+                  <a:schemeClr val="bg2">
+                    <a:lumMod val="50000"/>
+                  </a:schemeClr>
+                </a:solidFill>
+                <a:latin typeface="Segoe UI" panose="020B0502040204020203" pitchFamily="34" charset="0"/>
+                <a:cs typeface="Segoe UI" panose="020B0502040204020203" pitchFamily="34" charset="0"/>
+              </a:rPr>
+              <a:t>-&gt; Dynamiser via la technologie</a:t>
+            </a:r>
+          </a:p>
+          <a:p>
+            <a:pPr marL="0" indent="0">
+              <a:buNone/>
+            </a:pPr>
+            <a:r>
+              <a:rPr lang="fr-FR" dirty="0">
+                <a:solidFill>
+                  <a:schemeClr val="bg2">
+                    <a:lumMod val="50000"/>
+                  </a:schemeClr>
+                </a:solidFill>
+                <a:latin typeface="Segoe UI" panose="020B0502040204020203" pitchFamily="34" charset="0"/>
+                <a:cs typeface="Segoe UI" panose="020B0502040204020203" pitchFamily="34" charset="0"/>
+              </a:rPr>
+              <a:t>	</a:t>
+            </a:r>
+            <a:r>
+              <a:rPr lang="fr-FR" dirty="0" smtClean="0">
+                <a:solidFill>
+                  <a:schemeClr val="bg2">
+                    <a:lumMod val="50000"/>
+                  </a:schemeClr>
+                </a:solidFill>
+                <a:latin typeface="Segoe UI" panose="020B0502040204020203" pitchFamily="34" charset="0"/>
+                <a:cs typeface="Segoe UI" panose="020B0502040204020203" pitchFamily="34" charset="0"/>
+              </a:rPr>
+              <a:t>-&gt; Proche des jeunes (génération Y)</a:t>
+            </a:r>
+            <a:endParaRPr lang="fr-FR" dirty="0">
+              <a:solidFill>
+                <a:schemeClr val="bg2">
+                  <a:lumMod val="50000"/>
+                </a:schemeClr>
+              </a:solidFill>
+              <a:latin typeface="Segoe UI" panose="020B0502040204020203" pitchFamily="34" charset="0"/>
+              <a:cs typeface="Segoe UI" panose="020B0502040204020203" pitchFamily="34" charset="0"/>
+            </a:endParaRPr>
           </a:p>
         </p:txBody>
       </p:sp>

</xml_diff>